<commit_message>
uppata la mia parte
</commit_message>
<xml_diff>
--- a/RQ/Esterni/presentazione/RP-Presentazione.pptx
+++ b/RQ/Esterni/presentazione/RP-Presentazione.pptx
@@ -115,7 +115,7 @@
   </p:defaultTextStyle>
   <p:extLst>
     <p:ext uri="{521415D9-36F7-43E2-AB2F-B90AF26B5E84}">
-      <p14:sectionLst xmlns:p14="http://schemas.microsoft.com/office/powerpoint/2010/main" xmlns="">
+      <p14:sectionLst xmlns="" xmlns:p14="http://schemas.microsoft.com/office/powerpoint/2010/main">
         <p14:section name="Presentazione" id="{34E9BEB9-075B-4CFE-8BA4-B412D906568B}">
           <p14:sldIdLst>
             <p14:sldId id="256"/>
@@ -434,7 +434,7 @@
     </p:spTree>
     <p:extLst>
       <p:ext uri="{BB962C8B-B14F-4D97-AF65-F5344CB8AC3E}">
-        <p14:creationId xmlns:p14="http://schemas.microsoft.com/office/powerpoint/2010/main" xmlns="" val="1382979574"/>
+        <p14:creationId xmlns="" xmlns:p14="http://schemas.microsoft.com/office/powerpoint/2010/main" val="1382979574"/>
       </p:ext>
     </p:extLst>
   </p:cSld>
@@ -609,7 +609,7 @@
     </p:spTree>
     <p:extLst>
       <p:ext uri="{BB962C8B-B14F-4D97-AF65-F5344CB8AC3E}">
-        <p14:creationId xmlns:p14="http://schemas.microsoft.com/office/powerpoint/2010/main" xmlns="" val="4174330178"/>
+        <p14:creationId xmlns="" xmlns:p14="http://schemas.microsoft.com/office/powerpoint/2010/main" val="4174330178"/>
       </p:ext>
     </p:extLst>
   </p:cSld>
@@ -14389,7 +14389,7 @@
           <a:blip r:embed="rId3" cstate="print">
             <a:extLst>
               <a:ext uri="{28A0092B-C50C-407E-A947-70E740481C1C}">
-                <a14:useLocalDpi xmlns:a14="http://schemas.microsoft.com/office/drawing/2010/main" xmlns="" val="0"/>
+                <a14:useLocalDpi xmlns="" xmlns:a14="http://schemas.microsoft.com/office/drawing/2010/main" val="0"/>
               </a:ext>
             </a:extLst>
           </a:blip>
@@ -14410,7 +14410,7 @@
     </p:spTree>
     <p:extLst>
       <p:ext uri="{BB962C8B-B14F-4D97-AF65-F5344CB8AC3E}">
-        <p14:creationId xmlns:p14="http://schemas.microsoft.com/office/powerpoint/2010/main" xmlns="" val="3567273252"/>
+        <p14:creationId xmlns="" xmlns:p14="http://schemas.microsoft.com/office/powerpoint/2010/main" val="3567273252"/>
       </p:ext>
     </p:extLst>
   </p:cSld>
@@ -14456,7 +14456,7 @@
           <a:blip r:embed="rId2" cstate="print">
             <a:extLst>
               <a:ext uri="{28A0092B-C50C-407E-A947-70E740481C1C}">
-                <a14:useLocalDpi xmlns:a14="http://schemas.microsoft.com/office/drawing/2010/main" xmlns="" val="0"/>
+                <a14:useLocalDpi xmlns="" xmlns:a14="http://schemas.microsoft.com/office/drawing/2010/main" val="0"/>
               </a:ext>
             </a:extLst>
           </a:blip>
@@ -14635,7 +14635,7 @@
     </p:spTree>
     <p:extLst>
       <p:ext uri="{BB962C8B-B14F-4D97-AF65-F5344CB8AC3E}">
-        <p14:creationId xmlns:p14="http://schemas.microsoft.com/office/powerpoint/2010/main" xmlns="" val="476818001"/>
+        <p14:creationId xmlns="" xmlns:p14="http://schemas.microsoft.com/office/powerpoint/2010/main" val="476818001"/>
       </p:ext>
     </p:extLst>
   </p:cSld>
@@ -14681,7 +14681,7 @@
           <a:blip r:embed="rId2" cstate="print">
             <a:extLst>
               <a:ext uri="{28A0092B-C50C-407E-A947-70E740481C1C}">
-                <a14:useLocalDpi xmlns:a14="http://schemas.microsoft.com/office/drawing/2010/main" xmlns="" val="0"/>
+                <a14:useLocalDpi xmlns="" xmlns:a14="http://schemas.microsoft.com/office/drawing/2010/main" val="0"/>
               </a:ext>
             </a:extLst>
           </a:blip>
@@ -14787,7 +14787,7 @@
     </p:spTree>
     <p:extLst>
       <p:ext uri="{BB962C8B-B14F-4D97-AF65-F5344CB8AC3E}">
-        <p14:creationId xmlns:p14="http://schemas.microsoft.com/office/powerpoint/2010/main" xmlns="" val="318276201"/>
+        <p14:creationId xmlns="" xmlns:p14="http://schemas.microsoft.com/office/powerpoint/2010/main" val="318276201"/>
       </p:ext>
     </p:extLst>
   </p:cSld>
@@ -14833,7 +14833,7 @@
           <a:blip r:embed="rId2" cstate="print">
             <a:extLst>
               <a:ext uri="{28A0092B-C50C-407E-A947-70E740481C1C}">
-                <a14:useLocalDpi xmlns:a14="http://schemas.microsoft.com/office/drawing/2010/main" xmlns="" val="0"/>
+                <a14:useLocalDpi xmlns="" xmlns:a14="http://schemas.microsoft.com/office/drawing/2010/main" val="0"/>
               </a:ext>
             </a:extLst>
           </a:blip>
@@ -14914,10 +14914,104 @@
           </a:p>
         </p:txBody>
       </p:sp>
+      <p:sp>
+        <p:nvSpPr>
+          <p:cNvPr id="5" name="CasellaDiTesto 4"/>
+          <p:cNvSpPr txBox="1"/>
+          <p:nvPr/>
+        </p:nvSpPr>
+        <p:spPr>
+          <a:xfrm>
+            <a:off x="1187624" y="2420888"/>
+            <a:ext cx="6912768" cy="2031325"/>
+          </a:xfrm>
+          <a:prstGeom prst="rect">
+            <a:avLst/>
+          </a:prstGeom>
+          <a:noFill/>
+        </p:spPr>
+        <p:txBody>
+          <a:bodyPr wrap="square" rtlCol="0">
+            <a:spAutoFit/>
+          </a:bodyPr>
+          <a:lstStyle/>
+          <a:p>
+            <a:pPr>
+              <a:buFont typeface="Arial" pitchFamily="34" charset="0"/>
+              <a:buChar char="•"/>
+            </a:pPr>
+            <a:r>
+              <a:rPr lang="it-IT" dirty="0" smtClean="0"/>
+              <a:t> </a:t>
+            </a:r>
+            <a:r>
+              <a:rPr lang="it-IT" dirty="0" smtClean="0"/>
+              <a:t>Concomitanza stretta di esami e impegni</a:t>
+            </a:r>
+          </a:p>
+          <a:p>
+            <a:pPr>
+              <a:buFont typeface="Arial" pitchFamily="34" charset="0"/>
+              <a:buChar char="•"/>
+            </a:pPr>
+            <a:endParaRPr lang="it-IT" dirty="0" smtClean="0"/>
+          </a:p>
+          <a:p>
+            <a:pPr>
+              <a:buFont typeface="Arial" pitchFamily="34" charset="0"/>
+              <a:buChar char="•"/>
+            </a:pPr>
+            <a:r>
+              <a:rPr lang="it-IT" dirty="0" smtClean="0"/>
+              <a:t> JSP, SQL</a:t>
+            </a:r>
+          </a:p>
+          <a:p>
+            <a:pPr>
+              <a:buFont typeface="Arial" pitchFamily="34" charset="0"/>
+              <a:buChar char="•"/>
+            </a:pPr>
+            <a:endParaRPr lang="it-IT" dirty="0" smtClean="0"/>
+          </a:p>
+          <a:p>
+            <a:pPr>
+              <a:buFont typeface="Arial" pitchFamily="34" charset="0"/>
+              <a:buChar char="•"/>
+            </a:pPr>
+            <a:r>
+              <a:rPr lang="it-IT" dirty="0" smtClean="0"/>
+              <a:t> </a:t>
+            </a:r>
+            <a:r>
+              <a:rPr lang="it-IT" dirty="0" smtClean="0"/>
+              <a:t>Log &amp; Porte </a:t>
+            </a:r>
+            <a:r>
+              <a:rPr lang="it-IT" dirty="0" err="1" smtClean="0"/>
+              <a:t>email</a:t>
+            </a:r>
+            <a:endParaRPr lang="it-IT" dirty="0" smtClean="0"/>
+          </a:p>
+          <a:p>
+            <a:pPr>
+              <a:buFont typeface="Arial" pitchFamily="34" charset="0"/>
+              <a:buChar char="•"/>
+            </a:pPr>
+            <a:endParaRPr lang="it-IT" dirty="0" smtClean="0"/>
+          </a:p>
+          <a:p>
+            <a:pPr>
+              <a:buFont typeface="Arial" pitchFamily="34" charset="0"/>
+              <a:buChar char="•"/>
+            </a:pPr>
+            <a:endParaRPr lang="it-IT" dirty="0" smtClean="0"/>
+          </a:p>
+        </p:txBody>
+      </p:sp>
     </p:spTree>
     <p:extLst>
       <p:ext uri="{BB962C8B-B14F-4D97-AF65-F5344CB8AC3E}">
-        <p14:creationId xmlns:p14="http://schemas.microsoft.com/office/powerpoint/2010/main" xmlns="" val="829312757"/>
+        <p14:creationId xmlns="" xmlns:p14="http://schemas.microsoft.com/office/powerpoint/2010/main" val="829312757"/>
       </p:ext>
     </p:extLst>
   </p:cSld>

</xml_diff>